<commit_message>
added and changed some stuff
</commit_message>
<xml_diff>
--- a/Unit 4/Live Session Unit 4 and BO.pptx
+++ b/Unit 4/Live Session Unit 4 and BO.pptx
@@ -8,10 +8,11 @@
     <p:sldId id="256" r:id="rId2"/>
     <p:sldId id="271" r:id="rId3"/>
     <p:sldId id="257" r:id="rId4"/>
-    <p:sldId id="261" r:id="rId5"/>
-    <p:sldId id="263" r:id="rId6"/>
-    <p:sldId id="262" r:id="rId7"/>
-    <p:sldId id="266" r:id="rId8"/>
+    <p:sldId id="272" r:id="rId5"/>
+    <p:sldId id="261" r:id="rId6"/>
+    <p:sldId id="263" r:id="rId7"/>
+    <p:sldId id="262" r:id="rId8"/>
+    <p:sldId id="266" r:id="rId9"/>
   </p:sldIdLst>
   <p:sldSz cx="9144000" cy="6858000" type="screen4x3"/>
   <p:notesSz cx="6858000" cy="9144000"/>
@@ -3088,8 +3089,8 @@
           </a:p>
         </p:txBody>
       </p:sp>
-      <mc:AlternateContent xmlns:mc="http://schemas.openxmlformats.org/markup-compatibility/2006" xmlns:a14="http://schemas.microsoft.com/office/drawing/2010/main">
-        <mc:Choice Requires="a14">
+      <mc:AlternateContent xmlns:mc="http://schemas.openxmlformats.org/markup-compatibility/2006">
+        <mc:Choice xmlns:a14="http://schemas.microsoft.com/office/drawing/2010/main" Requires="a14">
           <p:sp>
             <p:nvSpPr>
               <p:cNvPr id="4" name="TextBox 3">
@@ -3105,7 +3106,7 @@
             <p:spPr>
               <a:xfrm>
                 <a:off x="818866" y="1690689"/>
-                <a:ext cx="7397086" cy="3416320"/>
+                <a:ext cx="7397086" cy="4247317"/>
               </a:xfrm>
               <a:prstGeom prst="rect">
                 <a:avLst/>
@@ -3295,7 +3296,16 @@
                 </a:r>
               </a:p>
               <a:p>
-                <a:endParaRPr lang="en-US" dirty="0"/>
+                <a:r>
+                  <a:rPr lang="en-US" dirty="0"/>
+                  <a:t>(1-.6Z)(1+.2Z) = 0</a:t>
+                </a:r>
+              </a:p>
+              <a:p>
+                <a:r>
+                  <a:rPr lang="en-US" dirty="0"/>
+                  <a:t>Z = 1/-.6 , 1/.2 = 1.667 , -5</a:t>
+                </a:r>
               </a:p>
               <a:p>
                 <a:endParaRPr lang="en-US" dirty="0"/>
@@ -3307,7 +3317,22 @@
                 </a:r>
               </a:p>
               <a:p>
-                <a:endParaRPr lang="en-US" dirty="0"/>
+                <a:r>
+                  <a:rPr lang="en-US" dirty="0"/>
+                  <a:t>-.12z^2 - .4z+1 = 0</a:t>
+                </a:r>
+              </a:p>
+              <a:p>
+                <a:r>
+                  <a:rPr lang="en-US" dirty="0"/>
+                  <a:t>0.4 ± sqrt(.4^2 – 4*(.12))/(2*.12) =&gt; 0.2/.12± .4/.12</a:t>
+                </a:r>
+              </a:p>
+              <a:p>
+                <a:r>
+                  <a:rPr lang="en-US" dirty="0"/>
+                  <a:t>Z = 1.6667 ,-5.0000</a:t>
+                </a:r>
               </a:p>
               <a:p>
                 <a:endParaRPr lang="en-US" dirty="0"/>
@@ -3321,7 +3346,7 @@
             </p:txBody>
           </p:sp>
         </mc:Choice>
-        <mc:Fallback xmlns="">
+        <mc:Fallback>
           <p:sp>
             <p:nvSpPr>
               <p:cNvPr id="4" name="TextBox 3">
@@ -3339,7 +3364,7 @@
             <p:spPr>
               <a:xfrm>
                 <a:off x="818866" y="1690689"/>
-                <a:ext cx="7397086" cy="3416320"/>
+                <a:ext cx="7397086" cy="4247317"/>
               </a:xfrm>
               <a:prstGeom prst="rect">
                 <a:avLst/>
@@ -3347,7 +3372,200 @@
               <a:blipFill>
                 <a:blip r:embed="rId2"/>
                 <a:stretch>
-                  <a:fillRect l="-514" t="-370" b="-1852"/>
+                  <a:fillRect l="-514" t="-298" b="-893"/>
+                </a:stretch>
+              </a:blipFill>
+            </p:spPr>
+            <p:txBody>
+              <a:bodyPr/>
+              <a:lstStyle/>
+              <a:p>
+                <a:r>
+                  <a:rPr lang="en-US">
+                    <a:noFill/>
+                  </a:rPr>
+                  <a:t> </a:t>
+                </a:r>
+              </a:p>
+            </p:txBody>
+          </p:sp>
+        </mc:Fallback>
+      </mc:AlternateContent>
+      <mc:AlternateContent xmlns:mc="http://schemas.openxmlformats.org/markup-compatibility/2006">
+        <mc:Choice xmlns:a14="http://schemas.microsoft.com/office/drawing/2010/main" Requires="a14">
+          <p:sp>
+            <p:nvSpPr>
+              <p:cNvPr id="3" name="Rectangle 2">
+                <a:extLst>
+                  <a:ext uri="{FF2B5EF4-FFF2-40B4-BE49-F238E27FC236}">
+                    <a16:creationId xmlns:a16="http://schemas.microsoft.com/office/drawing/2014/main" id="{97B51E3F-B84E-5949-8746-723B1C3B9767}"/>
+                  </a:ext>
+                </a:extLst>
+              </p:cNvPr>
+              <p:cNvSpPr/>
+              <p:nvPr/>
+            </p:nvSpPr>
+            <p:spPr>
+              <a:xfrm>
+                <a:off x="5931096" y="4482187"/>
+                <a:ext cx="2284856" cy="685124"/>
+              </a:xfrm>
+              <a:prstGeom prst="rect">
+                <a:avLst/>
+              </a:prstGeom>
+            </p:spPr>
+            <p:txBody>
+              <a:bodyPr wrap="none">
+                <a:spAutoFit/>
+              </a:bodyPr>
+              <a:lstStyle/>
+              <a:p>
+                <a14:m>
+                  <m:oMathPara xmlns:m="http://schemas.openxmlformats.org/officeDocument/2006/math">
+                    <m:oMathParaPr>
+                      <m:jc m:val="centerGroup"/>
+                    </m:oMathParaPr>
+                    <m:oMath xmlns:m="http://schemas.openxmlformats.org/officeDocument/2006/math">
+                      <m:r>
+                        <a:rPr lang="en-US" i="1">
+                          <a:latin typeface="Cambria Math" panose="02040503050406030204" pitchFamily="18" charset="0"/>
+                        </a:rPr>
+                        <m:t>𝑥</m:t>
+                      </m:r>
+                      <m:r>
+                        <a:rPr lang="en-US" i="1">
+                          <a:latin typeface="Cambria Math" panose="02040503050406030204" pitchFamily="18" charset="0"/>
+                        </a:rPr>
+                        <m:t>=</m:t>
+                      </m:r>
+                      <m:f>
+                        <m:fPr>
+                          <m:ctrlPr>
+                            <a:rPr lang="en-US" i="1">
+                              <a:latin typeface="Cambria Math" panose="02040503050406030204" pitchFamily="18" charset="0"/>
+                            </a:rPr>
+                          </m:ctrlPr>
+                        </m:fPr>
+                        <m:num>
+                          <m:r>
+                            <a:rPr lang="en-US" i="1">
+                              <a:latin typeface="Cambria Math" panose="02040503050406030204" pitchFamily="18" charset="0"/>
+                            </a:rPr>
+                            <m:t>−</m:t>
+                          </m:r>
+                          <m:r>
+                            <a:rPr lang="en-US" i="1">
+                              <a:latin typeface="Cambria Math" panose="02040503050406030204" pitchFamily="18" charset="0"/>
+                            </a:rPr>
+                            <m:t>𝑏</m:t>
+                          </m:r>
+                          <m:r>
+                            <a:rPr lang="en-US" i="1">
+                              <a:latin typeface="Cambria Math" panose="02040503050406030204" pitchFamily="18" charset="0"/>
+                            </a:rPr>
+                            <m:t>±</m:t>
+                          </m:r>
+                          <m:rad>
+                            <m:radPr>
+                              <m:degHide m:val="on"/>
+                              <m:ctrlPr>
+                                <a:rPr lang="en-US" i="1">
+                                  <a:latin typeface="Cambria Math" panose="02040503050406030204" pitchFamily="18" charset="0"/>
+                                </a:rPr>
+                              </m:ctrlPr>
+                            </m:radPr>
+                            <m:deg/>
+                            <m:e>
+                              <m:sSup>
+                                <m:sSupPr>
+                                  <m:ctrlPr>
+                                    <a:rPr lang="en-US" i="1">
+                                      <a:latin typeface="Cambria Math" panose="02040503050406030204" pitchFamily="18" charset="0"/>
+                                    </a:rPr>
+                                  </m:ctrlPr>
+                                </m:sSupPr>
+                                <m:e>
+                                  <m:r>
+                                    <a:rPr lang="en-US" i="1">
+                                      <a:latin typeface="Cambria Math" panose="02040503050406030204" pitchFamily="18" charset="0"/>
+                                    </a:rPr>
+                                    <m:t>𝑏</m:t>
+                                  </m:r>
+                                </m:e>
+                                <m:sup>
+                                  <m:r>
+                                    <a:rPr lang="en-US" i="1">
+                                      <a:latin typeface="Cambria Math" panose="02040503050406030204" pitchFamily="18" charset="0"/>
+                                    </a:rPr>
+                                    <m:t>2</m:t>
+                                  </m:r>
+                                </m:sup>
+                              </m:sSup>
+                              <m:r>
+                                <a:rPr lang="en-US" i="1">
+                                  <a:latin typeface="Cambria Math" panose="02040503050406030204" pitchFamily="18" charset="0"/>
+                                </a:rPr>
+                                <m:t>−4</m:t>
+                              </m:r>
+                              <m:r>
+                                <a:rPr lang="en-US" i="1">
+                                  <a:latin typeface="Cambria Math" panose="02040503050406030204" pitchFamily="18" charset="0"/>
+                                </a:rPr>
+                                <m:t>𝑎𝑐</m:t>
+                              </m:r>
+                            </m:e>
+                          </m:rad>
+                        </m:num>
+                        <m:den>
+                          <m:r>
+                            <a:rPr lang="en-US" i="1">
+                              <a:latin typeface="Cambria Math" panose="02040503050406030204" pitchFamily="18" charset="0"/>
+                            </a:rPr>
+                            <m:t>2</m:t>
+                          </m:r>
+                          <m:r>
+                            <a:rPr lang="en-US" i="1">
+                              <a:latin typeface="Cambria Math" panose="02040503050406030204" pitchFamily="18" charset="0"/>
+                            </a:rPr>
+                            <m:t>𝑎</m:t>
+                          </m:r>
+                        </m:den>
+                      </m:f>
+                    </m:oMath>
+                  </m:oMathPara>
+                </a14:m>
+                <a:endParaRPr lang="en-US" dirty="0"/>
+              </a:p>
+            </p:txBody>
+          </p:sp>
+        </mc:Choice>
+        <mc:Fallback>
+          <p:sp>
+            <p:nvSpPr>
+              <p:cNvPr id="3" name="Rectangle 2">
+                <a:extLst>
+                  <a:ext uri="{FF2B5EF4-FFF2-40B4-BE49-F238E27FC236}">
+                    <a16:creationId xmlns:a16="http://schemas.microsoft.com/office/drawing/2014/main" id="{97B51E3F-B84E-5949-8746-723B1C3B9767}"/>
+                  </a:ext>
+                </a:extLst>
+              </p:cNvPr>
+              <p:cNvSpPr>
+                <a:spLocks noRot="1" noChangeAspect="1" noMove="1" noResize="1" noEditPoints="1" noAdjustHandles="1" noChangeArrowheads="1" noChangeShapeType="1" noTextEdit="1"/>
+              </p:cNvSpPr>
+              <p:nvPr/>
+            </p:nvSpPr>
+            <p:spPr>
+              <a:xfrm>
+                <a:off x="5931096" y="4482187"/>
+                <a:ext cx="2284856" cy="685124"/>
+              </a:xfrm>
+              <a:prstGeom prst="rect">
+                <a:avLst/>
+              </a:prstGeom>
+              <a:blipFill>
+                <a:blip r:embed="rId3"/>
+                <a:stretch>
+                  <a:fillRect b="-1818"/>
                 </a:stretch>
               </a:blipFill>
             </p:spPr>
@@ -3530,6 +3748,324 @@
           <p:cNvPr id="2" name="Title 1">
             <a:extLst>
               <a:ext uri="{FF2B5EF4-FFF2-40B4-BE49-F238E27FC236}">
+                <a16:creationId xmlns:a16="http://schemas.microsoft.com/office/drawing/2014/main" id="{E8569C6D-BCD5-B547-9A5A-4383106C05EB}"/>
+              </a:ext>
+            </a:extLst>
+          </p:cNvPr>
+          <p:cNvSpPr>
+            <a:spLocks noGrp="1"/>
+          </p:cNvSpPr>
+          <p:nvPr>
+            <p:ph type="title"/>
+          </p:nvPr>
+        </p:nvSpPr>
+        <p:spPr/>
+        <p:txBody>
+          <a:bodyPr/>
+          <a:lstStyle/>
+          <a:p>
+            <a:r>
+              <a:rPr lang="en-US" dirty="0"/>
+              <a:t>Breakout 2</a:t>
+            </a:r>
+          </a:p>
+        </p:txBody>
+      </p:sp>
+      <mc:AlternateContent xmlns:mc="http://schemas.openxmlformats.org/markup-compatibility/2006">
+        <mc:Choice xmlns:a14="http://schemas.microsoft.com/office/drawing/2010/main" Requires="a14">
+          <p:sp>
+            <p:nvSpPr>
+              <p:cNvPr id="3" name="Content Placeholder 2">
+                <a:extLst>
+                  <a:ext uri="{FF2B5EF4-FFF2-40B4-BE49-F238E27FC236}">
+                    <a16:creationId xmlns:a16="http://schemas.microsoft.com/office/drawing/2014/main" id="{DA746BD7-D65D-4E4A-813E-A98F02DE180B}"/>
+                  </a:ext>
+                </a:extLst>
+              </p:cNvPr>
+              <p:cNvSpPr>
+                <a:spLocks noGrp="1"/>
+              </p:cNvSpPr>
+              <p:nvPr>
+                <p:ph idx="1"/>
+              </p:nvPr>
+            </p:nvSpPr>
+            <p:spPr/>
+            <p:txBody>
+              <a:bodyPr/>
+              <a:lstStyle/>
+              <a:p>
+                <a:pPr marL="0" indent="0">
+                  <a:buNone/>
+                </a:pPr>
+                <a:r>
+                  <a:rPr lang="en-US" dirty="0"/>
+                  <a:t>Here</a:t>
+                </a:r>
+              </a:p>
+              <a:p>
+                <a:pPr marL="0" indent="0">
+                  <a:buNone/>
+                </a:pPr>
+                <a:r>
+                  <a:rPr lang="en-US" dirty="0"/>
+                  <a:t>z</a:t>
+                </a:r>
+                <a14:m>
+                  <m:oMath xmlns:m="http://schemas.openxmlformats.org/officeDocument/2006/math">
+                    <m:r>
+                      <a:rPr lang="en-US" i="1" smtClean="0">
+                        <a:latin typeface="Cambria Math" panose="02040503050406030204" pitchFamily="18" charset="0"/>
+                      </a:rPr>
+                      <m:t>=</m:t>
+                    </m:r>
+                    <m:f>
+                      <m:fPr>
+                        <m:ctrlPr>
+                          <a:rPr lang="en-US" i="1" smtClean="0">
+                            <a:latin typeface="Cambria Math" panose="02040503050406030204" pitchFamily="18" charset="0"/>
+                          </a:rPr>
+                        </m:ctrlPr>
+                      </m:fPr>
+                      <m:num>
+                        <m:r>
+                          <a:rPr lang="en-US" i="1" smtClean="0">
+                            <a:latin typeface="Cambria Math" panose="02040503050406030204" pitchFamily="18" charset="0"/>
+                          </a:rPr>
+                          <m:t>−</m:t>
+                        </m:r>
+                        <m:r>
+                          <a:rPr lang="en-US" b="0" i="1" smtClean="0">
+                            <a:latin typeface="Cambria Math" panose="02040503050406030204" pitchFamily="18" charset="0"/>
+                          </a:rPr>
+                          <m:t>.5</m:t>
+                        </m:r>
+                        <m:r>
+                          <a:rPr lang="en-US" i="1" smtClean="0">
+                            <a:latin typeface="Cambria Math" panose="02040503050406030204" pitchFamily="18" charset="0"/>
+                          </a:rPr>
+                          <m:t>±</m:t>
+                        </m:r>
+                        <m:rad>
+                          <m:radPr>
+                            <m:degHide m:val="on"/>
+                            <m:ctrlPr>
+                              <a:rPr lang="en-US" i="1" smtClean="0">
+                                <a:latin typeface="Cambria Math" panose="02040503050406030204" pitchFamily="18" charset="0"/>
+                              </a:rPr>
+                            </m:ctrlPr>
+                          </m:radPr>
+                          <m:deg/>
+                          <m:e>
+                            <m:sSup>
+                              <m:sSupPr>
+                                <m:ctrlPr>
+                                  <a:rPr lang="en-US" i="1" smtClean="0">
+                                    <a:latin typeface="Cambria Math" panose="02040503050406030204" pitchFamily="18" charset="0"/>
+                                  </a:rPr>
+                                </m:ctrlPr>
+                              </m:sSupPr>
+                              <m:e>
+                                <m:r>
+                                  <a:rPr lang="en-US" b="0" i="1" smtClean="0">
+                                    <a:latin typeface="Cambria Math" panose="02040503050406030204" pitchFamily="18" charset="0"/>
+                                  </a:rPr>
+                                  <m:t>.5</m:t>
+                                </m:r>
+                              </m:e>
+                              <m:sup>
+                                <m:r>
+                                  <a:rPr lang="en-US" i="1" smtClean="0">
+                                    <a:latin typeface="Cambria Math" panose="02040503050406030204" pitchFamily="18" charset="0"/>
+                                  </a:rPr>
+                                  <m:t>2</m:t>
+                                </m:r>
+                              </m:sup>
+                            </m:sSup>
+                            <m:r>
+                              <a:rPr lang="en-US" i="1" smtClean="0">
+                                <a:latin typeface="Cambria Math" panose="02040503050406030204" pitchFamily="18" charset="0"/>
+                              </a:rPr>
+                              <m:t>−4</m:t>
+                            </m:r>
+                            <m:r>
+                              <a:rPr lang="en-US" b="0" i="1" smtClean="0">
+                                <a:latin typeface="Cambria Math" panose="02040503050406030204" pitchFamily="18" charset="0"/>
+                              </a:rPr>
+                              <m:t>∗.6</m:t>
+                            </m:r>
+                          </m:e>
+                        </m:rad>
+                      </m:num>
+                      <m:den>
+                        <m:r>
+                          <a:rPr lang="en-US" i="1" smtClean="0">
+                            <a:latin typeface="Cambria Math" panose="02040503050406030204" pitchFamily="18" charset="0"/>
+                          </a:rPr>
+                          <m:t>2</m:t>
+                        </m:r>
+                        <m:r>
+                          <a:rPr lang="en-US" b="0" i="1" smtClean="0">
+                            <a:latin typeface="Cambria Math" panose="02040503050406030204" pitchFamily="18" charset="0"/>
+                          </a:rPr>
+                          <m:t>∗.6</m:t>
+                        </m:r>
+                      </m:den>
+                    </m:f>
+                  </m:oMath>
+                </a14:m>
+                <a:endParaRPr lang="en-US" dirty="0"/>
+              </a:p>
+              <a:p>
+                <a:pPr marL="0" indent="0">
+                  <a:buNone/>
+                </a:pPr>
+                <a:r>
+                  <a:rPr lang="en-US" dirty="0"/>
+                  <a:t>-0.4167±1.2219i</a:t>
+                </a:r>
+              </a:p>
+              <a:p>
+                <a:pPr marL="0" indent="0">
+                  <a:buNone/>
+                </a:pPr>
+                <a:r>
+                  <a:rPr lang="en-US" dirty="0" err="1"/>
+                  <a:t>Modulas</a:t>
+                </a:r>
+                <a:endParaRPr lang="en-US" dirty="0"/>
+              </a:p>
+              <a:p>
+                <a:pPr marL="0" indent="0">
+                  <a:buNone/>
+                </a:pPr>
+                <a:r>
+                  <a:rPr lang="en-US" dirty="0"/>
+                  <a:t>Abs z = 1/sqrt(0.4167^2 + 1.2219^2) = 0.7746</a:t>
+                </a:r>
+              </a:p>
+              <a:p>
+                <a:pPr marL="0" indent="0">
+                  <a:buNone/>
+                </a:pPr>
+                <a:r>
+                  <a:rPr lang="en-US" dirty="0"/>
+                  <a:t>Freq = 0.3023</a:t>
+                </a:r>
+              </a:p>
+              <a:p>
+                <a:pPr marL="0" indent="0">
+                  <a:buNone/>
+                </a:pPr>
+                <a:endParaRPr lang="en-US" dirty="0"/>
+              </a:p>
+            </p:txBody>
+          </p:sp>
+        </mc:Choice>
+        <mc:Fallback>
+          <p:sp>
+            <p:nvSpPr>
+              <p:cNvPr id="3" name="Content Placeholder 2">
+                <a:extLst>
+                  <a:ext uri="{FF2B5EF4-FFF2-40B4-BE49-F238E27FC236}">
+                    <a16:creationId xmlns:a16="http://schemas.microsoft.com/office/drawing/2014/main" id="{DA746BD7-D65D-4E4A-813E-A98F02DE180B}"/>
+                  </a:ext>
+                </a:extLst>
+              </p:cNvPr>
+              <p:cNvSpPr>
+                <a:spLocks noGrp="1" noRot="1" noChangeAspect="1" noMove="1" noResize="1" noEditPoints="1" noAdjustHandles="1" noChangeArrowheads="1" noChangeShapeType="1" noTextEdit="1"/>
+              </p:cNvSpPr>
+              <p:nvPr>
+                <p:ph idx="1"/>
+              </p:nvPr>
+            </p:nvSpPr>
+            <p:spPr>
+              <a:blipFill>
+                <a:blip r:embed="rId2"/>
+                <a:stretch>
+                  <a:fillRect l="-1608" t="-2632"/>
+                </a:stretch>
+              </a:blipFill>
+            </p:spPr>
+            <p:txBody>
+              <a:bodyPr/>
+              <a:lstStyle/>
+              <a:p>
+                <a:r>
+                  <a:rPr lang="en-US">
+                    <a:noFill/>
+                  </a:rPr>
+                  <a:t> </a:t>
+                </a:r>
+              </a:p>
+            </p:txBody>
+          </p:sp>
+        </mc:Fallback>
+      </mc:AlternateContent>
+      <p:pic>
+        <p:nvPicPr>
+          <p:cNvPr id="4" name="Picture 3">
+            <a:extLst>
+              <a:ext uri="{FF2B5EF4-FFF2-40B4-BE49-F238E27FC236}">
+                <a16:creationId xmlns:a16="http://schemas.microsoft.com/office/drawing/2014/main" id="{A5958DA1-6A52-3048-9F57-364D10B843D7}"/>
+              </a:ext>
+            </a:extLst>
+          </p:cNvPr>
+          <p:cNvPicPr>
+            <a:picLocks noChangeAspect="1"/>
+          </p:cNvPicPr>
+          <p:nvPr/>
+        </p:nvPicPr>
+        <p:blipFill>
+          <a:blip r:embed="rId3"/>
+          <a:stretch>
+            <a:fillRect/>
+          </a:stretch>
+        </p:blipFill>
+        <p:spPr>
+          <a:xfrm>
+            <a:off x="4572000" y="1825625"/>
+            <a:ext cx="3818374" cy="3992252"/>
+          </a:xfrm>
+          <a:prstGeom prst="rect">
+            <a:avLst/>
+          </a:prstGeom>
+        </p:spPr>
+      </p:pic>
+    </p:spTree>
+    <p:extLst>
+      <p:ext uri="{BB962C8B-B14F-4D97-AF65-F5344CB8AC3E}">
+        <p14:creationId xmlns:p14="http://schemas.microsoft.com/office/powerpoint/2010/main" val="3715062622"/>
+      </p:ext>
+    </p:extLst>
+  </p:cSld>
+  <p:clrMapOvr>
+    <a:masterClrMapping/>
+  </p:clrMapOvr>
+</p:sld>
+</file>
+
+<file path=ppt/slides/slide5.xml><?xml version="1.0" encoding="utf-8"?>
+<p:sld xmlns:a="http://schemas.openxmlformats.org/drawingml/2006/main" xmlns:r="http://schemas.openxmlformats.org/officeDocument/2006/relationships" xmlns:p="http://schemas.openxmlformats.org/presentationml/2006/main">
+  <p:cSld>
+    <p:spTree>
+      <p:nvGrpSpPr>
+        <p:cNvPr id="1" name=""/>
+        <p:cNvGrpSpPr/>
+        <p:nvPr/>
+      </p:nvGrpSpPr>
+      <p:grpSpPr>
+        <a:xfrm>
+          <a:off x="0" y="0"/>
+          <a:ext cx="0" cy="0"/>
+          <a:chOff x="0" y="0"/>
+          <a:chExt cx="0" cy="0"/>
+        </a:xfrm>
+      </p:grpSpPr>
+      <p:sp>
+        <p:nvSpPr>
+          <p:cNvPr id="2" name="Title 1">
+            <a:extLst>
+              <a:ext uri="{FF2B5EF4-FFF2-40B4-BE49-F238E27FC236}">
                 <a16:creationId xmlns:a16="http://schemas.microsoft.com/office/drawing/2014/main" id="{7A0EE802-10C6-C744-8037-2A132E0CDBD1}"/>
               </a:ext>
             </a:extLst>
@@ -3637,7 +4173,7 @@
 </p:sld>
 </file>
 
-<file path=ppt/slides/slide5.xml><?xml version="1.0" encoding="utf-8"?>
+<file path=ppt/slides/slide6.xml><?xml version="1.0" encoding="utf-8"?>
 <p:sld xmlns:a="http://schemas.openxmlformats.org/drawingml/2006/main" xmlns:r="http://schemas.openxmlformats.org/officeDocument/2006/relationships" xmlns:p="http://schemas.openxmlformats.org/presentationml/2006/main">
   <p:cSld>
     <p:spTree>
@@ -3810,7 +4346,7 @@
 </p:sld>
 </file>
 
-<file path=ppt/slides/slide6.xml><?xml version="1.0" encoding="utf-8"?>
+<file path=ppt/slides/slide7.xml><?xml version="1.0" encoding="utf-8"?>
 <p:sld xmlns:a="http://schemas.openxmlformats.org/drawingml/2006/main" xmlns:r="http://schemas.openxmlformats.org/officeDocument/2006/relationships" xmlns:p="http://schemas.openxmlformats.org/presentationml/2006/main">
   <p:cSld>
     <p:spTree>
@@ -5342,7 +5878,7 @@
 </p:sld>
 </file>
 
-<file path=ppt/slides/slide7.xml><?xml version="1.0" encoding="utf-8"?>
+<file path=ppt/slides/slide8.xml><?xml version="1.0" encoding="utf-8"?>
 <p:sld xmlns:a="http://schemas.openxmlformats.org/drawingml/2006/main" xmlns:r="http://schemas.openxmlformats.org/officeDocument/2006/relationships" xmlns:p="http://schemas.openxmlformats.org/presentationml/2006/main">
   <p:cSld>
     <p:spTree>

</xml_diff>